<commit_message>
final changes befor submit
</commit_message>
<xml_diff>
--- a/results_04_05.pptx
+++ b/results_04_05.pptx
@@ -281,7 +281,7 @@
           <a:p>
             <a:fld id="{15A59631-E798-A74D-A0F8-ED244256C4A9}" type="datetimeFigureOut">
               <a:rPr lang="en-ES" smtClean="0"/>
-              <a:t>13/6/23</a:t>
+              <a:t>16/6/23</a:t>
             </a:fld>
             <a:endParaRPr lang="en-ES"/>
           </a:p>
@@ -481,7 +481,7 @@
           <a:p>
             <a:fld id="{15A59631-E798-A74D-A0F8-ED244256C4A9}" type="datetimeFigureOut">
               <a:rPr lang="en-ES" smtClean="0"/>
-              <a:t>13/6/23</a:t>
+              <a:t>16/6/23</a:t>
             </a:fld>
             <a:endParaRPr lang="en-ES"/>
           </a:p>
@@ -691,7 +691,7 @@
           <a:p>
             <a:fld id="{15A59631-E798-A74D-A0F8-ED244256C4A9}" type="datetimeFigureOut">
               <a:rPr lang="en-ES" smtClean="0"/>
-              <a:t>13/6/23</a:t>
+              <a:t>16/6/23</a:t>
             </a:fld>
             <a:endParaRPr lang="en-ES"/>
           </a:p>
@@ -891,7 +891,7 @@
           <a:p>
             <a:fld id="{15A59631-E798-A74D-A0F8-ED244256C4A9}" type="datetimeFigureOut">
               <a:rPr lang="en-ES" smtClean="0"/>
-              <a:t>13/6/23</a:t>
+              <a:t>16/6/23</a:t>
             </a:fld>
             <a:endParaRPr lang="en-ES"/>
           </a:p>
@@ -1167,7 +1167,7 @@
           <a:p>
             <a:fld id="{15A59631-E798-A74D-A0F8-ED244256C4A9}" type="datetimeFigureOut">
               <a:rPr lang="en-ES" smtClean="0"/>
-              <a:t>13/6/23</a:t>
+              <a:t>16/6/23</a:t>
             </a:fld>
             <a:endParaRPr lang="en-ES"/>
           </a:p>
@@ -1435,7 +1435,7 @@
           <a:p>
             <a:fld id="{15A59631-E798-A74D-A0F8-ED244256C4A9}" type="datetimeFigureOut">
               <a:rPr lang="en-ES" smtClean="0"/>
-              <a:t>13/6/23</a:t>
+              <a:t>16/6/23</a:t>
             </a:fld>
             <a:endParaRPr lang="en-ES"/>
           </a:p>
@@ -1850,7 +1850,7 @@
           <a:p>
             <a:fld id="{15A59631-E798-A74D-A0F8-ED244256C4A9}" type="datetimeFigureOut">
               <a:rPr lang="en-ES" smtClean="0"/>
-              <a:t>13/6/23</a:t>
+              <a:t>16/6/23</a:t>
             </a:fld>
             <a:endParaRPr lang="en-ES"/>
           </a:p>
@@ -1992,7 +1992,7 @@
           <a:p>
             <a:fld id="{15A59631-E798-A74D-A0F8-ED244256C4A9}" type="datetimeFigureOut">
               <a:rPr lang="en-ES" smtClean="0"/>
-              <a:t>13/6/23</a:t>
+              <a:t>16/6/23</a:t>
             </a:fld>
             <a:endParaRPr lang="en-ES"/>
           </a:p>
@@ -2105,7 +2105,7 @@
           <a:p>
             <a:fld id="{15A59631-E798-A74D-A0F8-ED244256C4A9}" type="datetimeFigureOut">
               <a:rPr lang="en-ES" smtClean="0"/>
-              <a:t>13/6/23</a:t>
+              <a:t>16/6/23</a:t>
             </a:fld>
             <a:endParaRPr lang="en-ES"/>
           </a:p>
@@ -2418,7 +2418,7 @@
           <a:p>
             <a:fld id="{15A59631-E798-A74D-A0F8-ED244256C4A9}" type="datetimeFigureOut">
               <a:rPr lang="en-ES" smtClean="0"/>
-              <a:t>13/6/23</a:t>
+              <a:t>16/6/23</a:t>
             </a:fld>
             <a:endParaRPr lang="en-ES"/>
           </a:p>
@@ -2707,7 +2707,7 @@
           <a:p>
             <a:fld id="{15A59631-E798-A74D-A0F8-ED244256C4A9}" type="datetimeFigureOut">
               <a:rPr lang="en-ES" smtClean="0"/>
-              <a:t>13/6/23</a:t>
+              <a:t>16/6/23</a:t>
             </a:fld>
             <a:endParaRPr lang="en-ES"/>
           </a:p>
@@ -2950,7 +2950,7 @@
           <a:p>
             <a:fld id="{15A59631-E798-A74D-A0F8-ED244256C4A9}" type="datetimeFigureOut">
               <a:rPr lang="en-ES" smtClean="0"/>
-              <a:t>13/6/23</a:t>
+              <a:t>16/6/23</a:t>
             </a:fld>
             <a:endParaRPr lang="en-ES"/>
           </a:p>
@@ -8360,7 +8360,7 @@
         </p:blipFill>
         <p:spPr>
           <a:xfrm>
-            <a:off x="79991" y="367629"/>
+            <a:off x="120568" y="-55754"/>
             <a:ext cx="4689143" cy="3516857"/>
           </a:xfrm>
         </p:spPr>

</xml_diff>